<commit_message>
Update QEMU+KVM, I/O Virtualization Software
</commit_message>
<xml_diff>
--- a/images/theory_analysis/IO_Virtualization_Software/IO_Virtualization_Software.pptx
+++ b/images/theory_analysis/IO_Virtualization_Software/IO_Virtualization_Software.pptx
@@ -231,7 +231,7 @@
           <a:p>
             <a:fld id="{6CD5550B-26C4-49A9-A5BA-636EF7BE6CE9}" type="datetimeFigureOut">
               <a:rPr lang="ko-KR" altLang="en-US" smtClean="0"/>
-              <a:t>2017-03-26</a:t>
+              <a:t>2017-04-02</a:t>
             </a:fld>
             <a:endParaRPr lang="ko-KR" altLang="en-US"/>
           </a:p>
@@ -680,7 +680,7 @@
           <a:p>
             <a:fld id="{D1175CA7-6D0D-456E-91CF-42453B260CBB}" type="datetime1">
               <a:rPr lang="ko-KR" altLang="en-US" smtClean="0"/>
-              <a:t>2017-03-26</a:t>
+              <a:t>2017-04-02</a:t>
             </a:fld>
             <a:endParaRPr lang="ko-KR" altLang="en-US"/>
           </a:p>
@@ -852,7 +852,7 @@
           <a:p>
             <a:fld id="{F572B1F4-153C-4A3D-B92C-D132A8F6E98C}" type="datetime1">
               <a:rPr lang="ko-KR" altLang="en-US" smtClean="0"/>
-              <a:t>2017-03-26</a:t>
+              <a:t>2017-04-02</a:t>
             </a:fld>
             <a:endParaRPr lang="ko-KR" altLang="en-US"/>
           </a:p>
@@ -1027,7 +1027,7 @@
           <a:p>
             <a:fld id="{9196EAD1-6682-46F6-B8B6-81ECC8FD814D}" type="datetime1">
               <a:rPr lang="ko-KR" altLang="en-US" smtClean="0"/>
-              <a:t>2017-03-26</a:t>
+              <a:t>2017-04-02</a:t>
             </a:fld>
             <a:endParaRPr lang="ko-KR" altLang="en-US"/>
           </a:p>
@@ -1192,7 +1192,7 @@
           <a:p>
             <a:fld id="{14310B56-7EFB-48E6-BE81-7C785972ABD8}" type="datetime1">
               <a:rPr lang="ko-KR" altLang="en-US" smtClean="0"/>
-              <a:t>2017-03-26</a:t>
+              <a:t>2017-04-02</a:t>
             </a:fld>
             <a:endParaRPr lang="ko-KR" altLang="en-US"/>
           </a:p>
@@ -1451,7 +1451,7 @@
           <a:p>
             <a:fld id="{190F1B79-1B1A-4DFF-8C68-9CC48E7FA05D}" type="datetime1">
               <a:rPr lang="ko-KR" altLang="en-US" smtClean="0"/>
-              <a:t>2017-03-26</a:t>
+              <a:t>2017-04-02</a:t>
             </a:fld>
             <a:endParaRPr lang="ko-KR" altLang="en-US"/>
           </a:p>
@@ -1741,7 +1741,7 @@
           <a:p>
             <a:fld id="{3D13B7D2-1C1C-483B-8CB7-A5F8B7473F76}" type="datetime1">
               <a:rPr lang="ko-KR" altLang="en-US" smtClean="0"/>
-              <a:t>2017-03-26</a:t>
+              <a:t>2017-04-02</a:t>
             </a:fld>
             <a:endParaRPr lang="ko-KR" altLang="en-US"/>
           </a:p>
@@ -2158,7 +2158,7 @@
           <a:p>
             <a:fld id="{01961C1A-FB28-4B82-9288-9105E654905F}" type="datetime1">
               <a:rPr lang="ko-KR" altLang="en-US" smtClean="0"/>
-              <a:t>2017-03-26</a:t>
+              <a:t>2017-04-02</a:t>
             </a:fld>
             <a:endParaRPr lang="ko-KR" altLang="en-US"/>
           </a:p>
@@ -2271,7 +2271,7 @@
           <a:p>
             <a:fld id="{94937D1B-284B-4C4A-8143-F7FF4ED51637}" type="datetime1">
               <a:rPr lang="ko-KR" altLang="en-US" smtClean="0"/>
-              <a:t>2017-03-26</a:t>
+              <a:t>2017-04-02</a:t>
             </a:fld>
             <a:endParaRPr lang="ko-KR" altLang="en-US"/>
           </a:p>
@@ -2361,7 +2361,7 @@
           <a:p>
             <a:fld id="{8D022CCC-3C78-47DE-AFAE-98CE1C3333F5}" type="datetime1">
               <a:rPr lang="ko-KR" altLang="en-US" smtClean="0"/>
-              <a:t>2017-03-26</a:t>
+              <a:t>2017-04-02</a:t>
             </a:fld>
             <a:endParaRPr lang="ko-KR" altLang="en-US"/>
           </a:p>
@@ -2633,7 +2633,7 @@
           <a:p>
             <a:fld id="{448ADC24-6590-49A2-999E-124601EA945E}" type="datetime1">
               <a:rPr lang="ko-KR" altLang="en-US" smtClean="0"/>
-              <a:t>2017-03-26</a:t>
+              <a:t>2017-04-02</a:t>
             </a:fld>
             <a:endParaRPr lang="ko-KR" altLang="en-US"/>
           </a:p>
@@ -2881,7 +2881,7 @@
           <a:p>
             <a:fld id="{95705096-987C-4FE3-AD5C-136468AC0F33}" type="datetime1">
               <a:rPr lang="ko-KR" altLang="en-US" smtClean="0"/>
-              <a:t>2017-03-26</a:t>
+              <a:t>2017-04-02</a:t>
             </a:fld>
             <a:endParaRPr lang="ko-KR" altLang="en-US"/>
           </a:p>
@@ -3089,7 +3089,7 @@
           <a:p>
             <a:fld id="{3AF1B4EC-F934-4CC4-A9FD-F67AEFB87E01}" type="datetime1">
               <a:rPr lang="ko-KR" altLang="en-US" smtClean="0"/>
-              <a:t>2017-03-26</a:t>
+              <a:t>2017-04-02</a:t>
             </a:fld>
             <a:endParaRPr lang="ko-KR" altLang="en-US"/>
           </a:p>
@@ -5836,8 +5836,16 @@
           <a:p>
             <a:pPr algn="ctr"/>
             <a:r>
+              <a:rPr lang="en-US" altLang="ko-KR" sz="1400" smtClean="0"/>
+              <a:t>Main</a:t>
+            </a:r>
+            <a:r>
+              <a:rPr lang="en-US" altLang="ko-KR" sz="1400" smtClean="0"/>
+              <a:t> </a:t>
+            </a:r>
+            <a:r>
               <a:rPr lang="en-US" altLang="ko-KR" sz="1400" dirty="0" smtClean="0"/>
-              <a:t>Event Loop</a:t>
+              <a:t>Loop</a:t>
             </a:r>
             <a:endParaRPr lang="ko-KR" altLang="en-US" sz="1400" dirty="0"/>
           </a:p>
@@ -8364,6 +8372,26 @@
           <a:p>
             <a:pPr algn="ctr"/>
             <a:r>
+              <a:rPr lang="en-US" altLang="ko-KR" sz="1400" smtClean="0">
+                <a:solidFill>
+                  <a:schemeClr val="bg1">
+                    <a:lumMod val="65000"/>
+                  </a:schemeClr>
+                </a:solidFill>
+              </a:rPr>
+              <a:t>Main</a:t>
+            </a:r>
+            <a:r>
+              <a:rPr lang="en-US" altLang="ko-KR" sz="1400" smtClean="0">
+                <a:solidFill>
+                  <a:schemeClr val="bg1">
+                    <a:lumMod val="65000"/>
+                  </a:schemeClr>
+                </a:solidFill>
+              </a:rPr>
+              <a:t> </a:t>
+            </a:r>
+            <a:r>
               <a:rPr lang="en-US" altLang="ko-KR" sz="1400" dirty="0" smtClean="0">
                 <a:solidFill>
                   <a:schemeClr val="bg1">
@@ -8371,7 +8399,7 @@
                   </a:schemeClr>
                 </a:solidFill>
               </a:rPr>
-              <a:t>Event Loop</a:t>
+              <a:t>Loop</a:t>
             </a:r>
             <a:endParaRPr lang="ko-KR" altLang="en-US" sz="1400" dirty="0">
               <a:solidFill>
@@ -9458,8 +9486,12 @@
           <a:p>
             <a:pPr algn="ctr"/>
             <a:r>
+              <a:rPr lang="en-US" altLang="ko-KR" sz="1400" smtClean="0"/>
+              <a:t>Main </a:t>
+            </a:r>
+            <a:r>
               <a:rPr lang="en-US" altLang="ko-KR" sz="1400" dirty="0" smtClean="0"/>
-              <a:t>Event Loop</a:t>
+              <a:t>Loop</a:t>
             </a:r>
             <a:endParaRPr lang="ko-KR" altLang="en-US" sz="1400" dirty="0"/>
           </a:p>

</xml_diff>